<commit_message>
main index is lined
</commit_message>
<xml_diff>
--- a/Ppt/sahitya2indexer_photos.pptx
+++ b/Ppt/sahitya2indexer_photos.pptx
@@ -6,9 +6,11 @@
   </p:sldMasterIdLst>
   <p:sldIdLst>
     <p:sldId id="256" r:id="rId2"/>
-    <p:sldId id="257" r:id="rId3"/>
-    <p:sldId id="258" r:id="rId4"/>
-    <p:sldId id="259" r:id="rId5"/>
+    <p:sldId id="261" r:id="rId3"/>
+    <p:sldId id="260" r:id="rId4"/>
+    <p:sldId id="257" r:id="rId5"/>
+    <p:sldId id="258" r:id="rId6"/>
+    <p:sldId id="259" r:id="rId7"/>
   </p:sldIdLst>
   <p:sldSz cx="12192000" cy="6858000"/>
   <p:notesSz cx="6858000" cy="9144000"/>
@@ -107,6 +109,11 @@
       </a:defRPr>
     </a:lvl9pPr>
   </p:defaultTextStyle>
+  <p:extLst>
+    <p:ext uri="{EFAFB233-063F-42B5-8137-9DF3F51BA10A}">
+      <p15:sldGuideLst xmlns:p15="http://schemas.microsoft.com/office/powerpoint/2012/main"/>
+    </p:ext>
+  </p:extLst>
 </p:presentation>
 </file>
 
@@ -6222,8 +6229,8 @@
         </p:nvSpPr>
         <p:spPr>
           <a:xfrm>
-            <a:off x="1795118" y="2886075"/>
-            <a:ext cx="10396882" cy="1151965"/>
+            <a:off x="520506" y="886692"/>
+            <a:ext cx="10465196" cy="5049874"/>
           </a:xfrm>
         </p:spPr>
         <p:txBody>
@@ -6233,17 +6240,40 @@
           <a:lstStyle/>
           <a:p>
             <a:r>
-              <a:rPr lang="sa-IN" sz="23900" dirty="0" smtClean="0"/>
-              <a:t>चम्पू नाटकम्</a:t>
-            </a:r>
-            <a:endParaRPr lang="en-IN" sz="23900" dirty="0"/>
+              <a:rPr lang="kn-IN" sz="16600" smtClean="0">
+                <a:solidFill>
+                  <a:schemeClr val="bg1"/>
+                </a:solidFill>
+              </a:rPr>
+              <a:t>ಪಟ್ಟಣ ,</a:t>
+            </a:r>
+            <a:br>
+              <a:rPr lang="kn-IN" sz="16600" smtClean="0">
+                <a:solidFill>
+                  <a:schemeClr val="bg1"/>
+                </a:solidFill>
+              </a:rPr>
+            </a:br>
+            <a:r>
+              <a:rPr lang="kn-IN" sz="16600" smtClean="0">
+                <a:solidFill>
+                  <a:schemeClr val="bg1"/>
+                </a:solidFill>
+              </a:rPr>
+              <a:t>ಉಡುಗೆಗಳು</a:t>
+            </a:r>
+            <a:endParaRPr lang="en-IN" sz="16600" dirty="0">
+              <a:solidFill>
+                <a:schemeClr val="bg1"/>
+              </a:solidFill>
+            </a:endParaRPr>
           </a:p>
         </p:txBody>
       </p:sp>
     </p:spTree>
     <p:extLst>
       <p:ext uri="{BB962C8B-B14F-4D97-AF65-F5344CB8AC3E}">
-        <p14:creationId xmlns:p14="http://schemas.microsoft.com/office/powerpoint/2010/main" val="2745303093"/>
+        <p14:creationId xmlns:p14="http://schemas.microsoft.com/office/powerpoint/2010/main" val="1538188921"/>
       </p:ext>
     </p:extLst>
   </p:cSld>
@@ -6279,6 +6309,152 @@
           <a:chExt cx="0" cy="0"/>
         </a:xfrm>
       </p:grpSpPr>
+      <p:sp>
+        <p:nvSpPr>
+          <p:cNvPr id="2" name="Title 1"/>
+          <p:cNvSpPr>
+            <a:spLocks noGrp="1"/>
+          </p:cNvSpPr>
+          <p:nvPr>
+            <p:ph type="title"/>
+          </p:nvPr>
+        </p:nvSpPr>
+        <p:spPr>
+          <a:xfrm>
+            <a:off x="1954791" y="3114675"/>
+            <a:ext cx="10396882" cy="1151965"/>
+          </a:xfrm>
+        </p:spPr>
+        <p:txBody>
+          <a:bodyPr>
+            <a:noAutofit/>
+          </a:bodyPr>
+          <a:lstStyle/>
+          <a:p>
+            <a:r>
+              <a:rPr lang="sa-IN" sz="23900" dirty="0" smtClean="0">
+                <a:solidFill>
+                  <a:schemeClr val="tx1"/>
+                </a:solidFill>
+              </a:rPr>
+              <a:t>सहित्यसौरभ</a:t>
+            </a:r>
+            <a:endParaRPr lang="en-IN" sz="23900" dirty="0">
+              <a:solidFill>
+                <a:schemeClr val="tx1"/>
+              </a:solidFill>
+            </a:endParaRPr>
+          </a:p>
+        </p:txBody>
+      </p:sp>
+    </p:spTree>
+    <p:extLst>
+      <p:ext uri="{BB962C8B-B14F-4D97-AF65-F5344CB8AC3E}">
+        <p14:creationId xmlns:p14="http://schemas.microsoft.com/office/powerpoint/2010/main" val="2695860680"/>
+      </p:ext>
+    </p:extLst>
+  </p:cSld>
+  <p:clrMapOvr>
+    <a:masterClrMapping/>
+  </p:clrMapOvr>
+</p:sld>
+</file>
+
+<file path=ppt/slides/slide4.xml><?xml version="1.0" encoding="utf-8"?>
+<p:sld xmlns:a="http://schemas.openxmlformats.org/drawingml/2006/main" xmlns:r="http://schemas.openxmlformats.org/officeDocument/2006/relationships" xmlns:p="http://schemas.openxmlformats.org/presentationml/2006/main" showMasterSp="0">
+  <p:cSld>
+    <p:bg>
+      <p:bgPr>
+        <a:blipFill>
+          <a:blip r:embed="rId2"/>
+          <a:tile tx="0" ty="0" sx="100000" sy="100000" flip="none" algn="tl"/>
+        </a:blipFill>
+        <a:effectLst/>
+      </p:bgPr>
+    </p:bg>
+    <p:spTree>
+      <p:nvGrpSpPr>
+        <p:cNvPr id="1" name=""/>
+        <p:cNvGrpSpPr/>
+        <p:nvPr/>
+      </p:nvGrpSpPr>
+      <p:grpSpPr>
+        <a:xfrm>
+          <a:off x="0" y="0"/>
+          <a:ext cx="0" cy="0"/>
+          <a:chOff x="0" y="0"/>
+          <a:chExt cx="0" cy="0"/>
+        </a:xfrm>
+      </p:grpSpPr>
+      <p:sp>
+        <p:nvSpPr>
+          <p:cNvPr id="2" name="Title 1"/>
+          <p:cNvSpPr>
+            <a:spLocks noGrp="1"/>
+          </p:cNvSpPr>
+          <p:nvPr>
+            <p:ph type="title"/>
+          </p:nvPr>
+        </p:nvSpPr>
+        <p:spPr>
+          <a:xfrm>
+            <a:off x="1795118" y="2886075"/>
+            <a:ext cx="10396882" cy="1151965"/>
+          </a:xfrm>
+        </p:spPr>
+        <p:txBody>
+          <a:bodyPr>
+            <a:noAutofit/>
+          </a:bodyPr>
+          <a:lstStyle/>
+          <a:p>
+            <a:r>
+              <a:rPr lang="sa-IN" sz="23900" dirty="0" smtClean="0"/>
+              <a:t>चम्पू नाटकम्</a:t>
+            </a:r>
+            <a:endParaRPr lang="en-IN" sz="23900" dirty="0"/>
+          </a:p>
+        </p:txBody>
+      </p:sp>
+    </p:spTree>
+    <p:extLst>
+      <p:ext uri="{BB962C8B-B14F-4D97-AF65-F5344CB8AC3E}">
+        <p14:creationId xmlns:p14="http://schemas.microsoft.com/office/powerpoint/2010/main" val="2745303093"/>
+      </p:ext>
+    </p:extLst>
+  </p:cSld>
+  <p:clrMapOvr>
+    <a:masterClrMapping/>
+  </p:clrMapOvr>
+</p:sld>
+</file>
+
+<file path=ppt/slides/slide5.xml><?xml version="1.0" encoding="utf-8"?>
+<p:sld xmlns:a="http://schemas.openxmlformats.org/drawingml/2006/main" xmlns:r="http://schemas.openxmlformats.org/officeDocument/2006/relationships" xmlns:p="http://schemas.openxmlformats.org/presentationml/2006/main" showMasterSp="0">
+  <p:cSld>
+    <p:bg>
+      <p:bgPr>
+        <a:blipFill>
+          <a:blip r:embed="rId2"/>
+          <a:tile tx="0" ty="0" sx="100000" sy="100000" flip="none" algn="tl"/>
+        </a:blipFill>
+        <a:effectLst/>
+      </p:bgPr>
+    </p:bg>
+    <p:spTree>
+      <p:nvGrpSpPr>
+        <p:cNvPr id="1" name=""/>
+        <p:cNvGrpSpPr/>
+        <p:nvPr/>
+      </p:nvGrpSpPr>
+      <p:grpSpPr>
+        <a:xfrm>
+          <a:off x="0" y="0"/>
+          <a:ext cx="0" cy="0"/>
+          <a:chOff x="0" y="0"/>
+          <a:chExt cx="0" cy="0"/>
+        </a:xfrm>
+      </p:grpSpPr>
       <p:sp useBgFill="1">
         <p:nvSpPr>
           <p:cNvPr id="2" name="Title 1"/>
@@ -6322,7 +6498,7 @@
 </p:sld>
 </file>
 
-<file path=ppt/slides/slide4.xml><?xml version="1.0" encoding="utf-8"?>
+<file path=ppt/slides/slide6.xml><?xml version="1.0" encoding="utf-8"?>
 <p:sld xmlns:a="http://schemas.openxmlformats.org/drawingml/2006/main" xmlns:r="http://schemas.openxmlformats.org/officeDocument/2006/relationships" xmlns:p="http://schemas.openxmlformats.org/presentationml/2006/main" showMasterSp="0">
   <p:cSld>
     <p:bg>

</xml_diff>